<commit_message>
Added State toJson and Action fromJson to prep for networking.
</commit_message>
<xml_diff>
--- a/images/VehicleFrames.pptx
+++ b/images/VehicleFrames.pptx
@@ -7,9 +7,9 @@
   <p:sldIdLst>
     <p:sldId id="256" r:id="rId2"/>
     <p:sldId id="257" r:id="rId3"/>
-    <p:sldId id="259" r:id="rId4"/>
-    <p:sldId id="258" r:id="rId5"/>
-    <p:sldId id="260" r:id="rId6"/>
+    <p:sldId id="260" r:id="rId4"/>
+    <p:sldId id="259" r:id="rId5"/>
+    <p:sldId id="258" r:id="rId6"/>
   </p:sldIdLst>
   <p:sldSz cx="12192000" cy="6858000"/>
   <p:notesSz cx="6858000" cy="9144000"/>
@@ -263,7 +263,7 @@
           <a:p>
             <a:fld id="{56E108D0-6AE7-49B2-AFDE-F7842EC0DADF}" type="datetimeFigureOut">
               <a:rPr lang="en-US" smtClean="0"/>
-              <a:t>2/27/2024</a:t>
+              <a:t>2/28/2024</a:t>
             </a:fld>
             <a:endParaRPr lang="en-US"/>
           </a:p>
@@ -461,7 +461,7 @@
           <a:p>
             <a:fld id="{56E108D0-6AE7-49B2-AFDE-F7842EC0DADF}" type="datetimeFigureOut">
               <a:rPr lang="en-US" smtClean="0"/>
-              <a:t>2/27/2024</a:t>
+              <a:t>2/28/2024</a:t>
             </a:fld>
             <a:endParaRPr lang="en-US"/>
           </a:p>
@@ -669,7 +669,7 @@
           <a:p>
             <a:fld id="{56E108D0-6AE7-49B2-AFDE-F7842EC0DADF}" type="datetimeFigureOut">
               <a:rPr lang="en-US" smtClean="0"/>
-              <a:t>2/27/2024</a:t>
+              <a:t>2/28/2024</a:t>
             </a:fld>
             <a:endParaRPr lang="en-US"/>
           </a:p>
@@ -867,7 +867,7 @@
           <a:p>
             <a:fld id="{56E108D0-6AE7-49B2-AFDE-F7842EC0DADF}" type="datetimeFigureOut">
               <a:rPr lang="en-US" smtClean="0"/>
-              <a:t>2/27/2024</a:t>
+              <a:t>2/28/2024</a:t>
             </a:fld>
             <a:endParaRPr lang="en-US"/>
           </a:p>
@@ -1142,7 +1142,7 @@
           <a:p>
             <a:fld id="{56E108D0-6AE7-49B2-AFDE-F7842EC0DADF}" type="datetimeFigureOut">
               <a:rPr lang="en-US" smtClean="0"/>
-              <a:t>2/27/2024</a:t>
+              <a:t>2/28/2024</a:t>
             </a:fld>
             <a:endParaRPr lang="en-US"/>
           </a:p>
@@ -1407,7 +1407,7 @@
           <a:p>
             <a:fld id="{56E108D0-6AE7-49B2-AFDE-F7842EC0DADF}" type="datetimeFigureOut">
               <a:rPr lang="en-US" smtClean="0"/>
-              <a:t>2/27/2024</a:t>
+              <a:t>2/28/2024</a:t>
             </a:fld>
             <a:endParaRPr lang="en-US"/>
           </a:p>
@@ -1819,7 +1819,7 @@
           <a:p>
             <a:fld id="{56E108D0-6AE7-49B2-AFDE-F7842EC0DADF}" type="datetimeFigureOut">
               <a:rPr lang="en-US" smtClean="0"/>
-              <a:t>2/27/2024</a:t>
+              <a:t>2/28/2024</a:t>
             </a:fld>
             <a:endParaRPr lang="en-US"/>
           </a:p>
@@ -1960,7 +1960,7 @@
           <a:p>
             <a:fld id="{56E108D0-6AE7-49B2-AFDE-F7842EC0DADF}" type="datetimeFigureOut">
               <a:rPr lang="en-US" smtClean="0"/>
-              <a:t>2/27/2024</a:t>
+              <a:t>2/28/2024</a:t>
             </a:fld>
             <a:endParaRPr lang="en-US"/>
           </a:p>
@@ -2073,7 +2073,7 @@
           <a:p>
             <a:fld id="{56E108D0-6AE7-49B2-AFDE-F7842EC0DADF}" type="datetimeFigureOut">
               <a:rPr lang="en-US" smtClean="0"/>
-              <a:t>2/27/2024</a:t>
+              <a:t>2/28/2024</a:t>
             </a:fld>
             <a:endParaRPr lang="en-US"/>
           </a:p>
@@ -2384,7 +2384,7 @@
           <a:p>
             <a:fld id="{56E108D0-6AE7-49B2-AFDE-F7842EC0DADF}" type="datetimeFigureOut">
               <a:rPr lang="en-US" smtClean="0"/>
-              <a:t>2/27/2024</a:t>
+              <a:t>2/28/2024</a:t>
             </a:fld>
             <a:endParaRPr lang="en-US"/>
           </a:p>
@@ -2672,7 +2672,7 @@
           <a:p>
             <a:fld id="{56E108D0-6AE7-49B2-AFDE-F7842EC0DADF}" type="datetimeFigureOut">
               <a:rPr lang="en-US" smtClean="0"/>
-              <a:t>2/27/2024</a:t>
+              <a:t>2/28/2024</a:t>
             </a:fld>
             <a:endParaRPr lang="en-US"/>
           </a:p>
@@ -2913,7 +2913,7 @@
           <a:p>
             <a:fld id="{56E108D0-6AE7-49B2-AFDE-F7842EC0DADF}" type="datetimeFigureOut">
               <a:rPr lang="en-US" smtClean="0"/>
-              <a:t>2/27/2024</a:t>
+              <a:t>2/28/2024</a:t>
             </a:fld>
             <a:endParaRPr lang="en-US"/>
           </a:p>
@@ -4313,10 +4313,239 @@
       </p:grpSpPr>
       <p:sp>
         <p:nvSpPr>
+          <p:cNvPr id="2" name="Title 1">
+            <a:extLst>
+              <a:ext uri="{FF2B5EF4-FFF2-40B4-BE49-F238E27FC236}">
+                <a16:creationId xmlns:a16="http://schemas.microsoft.com/office/drawing/2014/main" id="{3284076A-9AF3-F328-AABF-629D21CFBBA1}"/>
+              </a:ext>
+            </a:extLst>
+          </p:cNvPr>
+          <p:cNvSpPr>
+            <a:spLocks noGrp="1"/>
+          </p:cNvSpPr>
+          <p:nvPr>
+            <p:ph type="title"/>
+          </p:nvPr>
+        </p:nvSpPr>
+        <p:spPr/>
+        <p:txBody>
+          <a:bodyPr/>
+          <a:lstStyle/>
+          <a:p>
+            <a:r>
+              <a:rPr lang="en-US" dirty="0"/>
+              <a:t>Life-Long System</a:t>
+            </a:r>
+          </a:p>
+        </p:txBody>
+      </p:sp>
+      <p:sp>
+        <p:nvSpPr>
+          <p:cNvPr id="3" name="Content Placeholder 2">
+            <a:extLst>
+              <a:ext uri="{FF2B5EF4-FFF2-40B4-BE49-F238E27FC236}">
+                <a16:creationId xmlns:a16="http://schemas.microsoft.com/office/drawing/2014/main" id="{2433117F-A338-9250-E55F-1465550D7882}"/>
+              </a:ext>
+            </a:extLst>
+          </p:cNvPr>
+          <p:cNvSpPr>
+            <a:spLocks noGrp="1"/>
+          </p:cNvSpPr>
+          <p:nvPr>
+            <p:ph idx="1"/>
+          </p:nvPr>
+        </p:nvSpPr>
+        <p:spPr>
+          <a:xfrm>
+            <a:off x="838200" y="1381125"/>
+            <a:ext cx="6238875" cy="4795838"/>
+          </a:xfrm>
+        </p:spPr>
+        <p:txBody>
+          <a:bodyPr>
+            <a:normAutofit fontScale="70000" lnSpcReduction="20000"/>
+          </a:bodyPr>
+          <a:lstStyle/>
+          <a:p>
+            <a:r>
+              <a:rPr lang="en-US" dirty="0"/>
+              <a:t>Problem, most self-organizing happens at one layer. Want at least 2. Addressed with behavior tree and colony performance (will it flatten?)</a:t>
+            </a:r>
+          </a:p>
+          <a:p>
+            <a:pPr lvl="1"/>
+            <a:r>
+              <a:rPr lang="en-US" dirty="0"/>
+              <a:t>Alternative individual learning and ?social learning?</a:t>
+            </a:r>
+          </a:p>
+          <a:p>
+            <a:r>
+              <a:rPr lang="en-US" dirty="0"/>
+              <a:t> Qualia World isn't quite working, but the colony is. So can connect something.</a:t>
+            </a:r>
+          </a:p>
+          <a:p>
+            <a:pPr lvl="1"/>
+            <a:r>
+              <a:rPr lang="en-US" dirty="0"/>
+              <a:t>Genetic Programming worked with </a:t>
+            </a:r>
+            <a:r>
+              <a:rPr lang="en-US" dirty="0" err="1"/>
+              <a:t>Robocode</a:t>
+            </a:r>
+            <a:r>
+              <a:rPr lang="en-US" dirty="0"/>
+              <a:t>. Problem Genetic algorithm approaches are population based, not necessarily based on continuous spawning. How to do this?</a:t>
+            </a:r>
+          </a:p>
+          <a:p>
+            <a:pPr lvl="1"/>
+            <a:r>
+              <a:rPr lang="en-US" dirty="0"/>
+              <a:t>Examples found seem to only use mutation.</a:t>
+            </a:r>
+          </a:p>
+          <a:p>
+            <a:pPr lvl="1"/>
+            <a:r>
+              <a:rPr lang="en-US" dirty="0"/>
+              <a:t>Fitness eval (length of life) will be very sparse when agents do well. </a:t>
+            </a:r>
+            <a:r>
+              <a:rPr lang="en-US" i="1" dirty="0">
+                <a:solidFill>
+                  <a:srgbClr val="7030A0"/>
+                </a:solidFill>
+              </a:rPr>
+              <a:t>This matches the target domain of ASCE-BITS because feedback from humans has been shown to be sparse in the HRA version.</a:t>
+            </a:r>
+          </a:p>
+          <a:p>
+            <a:r>
+              <a:rPr lang="en-US" dirty="0"/>
+              <a:t>Not a lot academically:</a:t>
+            </a:r>
+          </a:p>
+          <a:p>
+            <a:pPr lvl="1"/>
+            <a:r>
+              <a:rPr lang="en-US" dirty="0"/>
+              <a:t>GADO: A Genetic Algorithm for Continuous Design Optimization Does the Field of Computational life?</a:t>
+            </a:r>
+          </a:p>
+          <a:p>
+            <a:pPr lvl="1"/>
+            <a:r>
+              <a:rPr lang="en-US" dirty="0"/>
+              <a:t>Genetic Algorithms and Artificial Life https://pdxscholar.library.pdf.edu/cgi/viewcontent.cgi?article=1003&amp;context=compsci_fac</a:t>
+            </a:r>
+          </a:p>
+        </p:txBody>
+      </p:sp>
+      <p:pic>
+        <p:nvPicPr>
+          <p:cNvPr id="5" name="Picture 4">
+            <a:extLst>
+              <a:ext uri="{FF2B5EF4-FFF2-40B4-BE49-F238E27FC236}">
+                <a16:creationId xmlns:a16="http://schemas.microsoft.com/office/drawing/2014/main" id="{38A0112F-5BFF-7FD6-23D8-332B94DB6800}"/>
+              </a:ext>
+            </a:extLst>
+          </p:cNvPr>
+          <p:cNvPicPr>
+            <a:picLocks noChangeAspect="1"/>
+          </p:cNvPicPr>
+          <p:nvPr/>
+        </p:nvPicPr>
+        <p:blipFill>
+          <a:blip r:embed="rId2"/>
+          <a:stretch>
+            <a:fillRect/>
+          </a:stretch>
+        </p:blipFill>
+        <p:spPr>
+          <a:xfrm>
+            <a:off x="7000875" y="3367784"/>
+            <a:ext cx="4981575" cy="2938730"/>
+          </a:xfrm>
+          <a:prstGeom prst="rect">
+            <a:avLst/>
+          </a:prstGeom>
+        </p:spPr>
+      </p:pic>
+      <p:pic>
+        <p:nvPicPr>
+          <p:cNvPr id="6" name="Picture 5">
+            <a:extLst>
+              <a:ext uri="{FF2B5EF4-FFF2-40B4-BE49-F238E27FC236}">
+                <a16:creationId xmlns:a16="http://schemas.microsoft.com/office/drawing/2014/main" id="{98CDB551-E9FF-72F3-0500-509A59F82EE9}"/>
+              </a:ext>
+            </a:extLst>
+          </p:cNvPr>
+          <p:cNvPicPr>
+            <a:picLocks noChangeAspect="1"/>
+          </p:cNvPicPr>
+          <p:nvPr/>
+        </p:nvPicPr>
+        <p:blipFill>
+          <a:blip r:embed="rId3"/>
+          <a:stretch>
+            <a:fillRect/>
+          </a:stretch>
+        </p:blipFill>
+        <p:spPr>
+          <a:xfrm>
+            <a:off x="6934199" y="867236"/>
+            <a:ext cx="4848225" cy="2370997"/>
+          </a:xfrm>
+          <a:prstGeom prst="rect">
+            <a:avLst/>
+          </a:prstGeom>
+        </p:spPr>
+      </p:pic>
+    </p:spTree>
+    <p:extLst>
+      <p:ext uri="{BB962C8B-B14F-4D97-AF65-F5344CB8AC3E}">
+        <p14:creationId xmlns:p14="http://schemas.microsoft.com/office/powerpoint/2010/main" val="590771946"/>
+      </p:ext>
+    </p:extLst>
+  </p:cSld>
+  <p:clrMapOvr>
+    <a:masterClrMapping/>
+  </p:clrMapOvr>
+</p:sld>
+</file>
+
+<file path=ppt/slides/slide4.xml><?xml version="1.0" encoding="utf-8"?>
+<p:sld xmlns:a="http://schemas.openxmlformats.org/drawingml/2006/main" xmlns:r="http://schemas.openxmlformats.org/officeDocument/2006/relationships" xmlns:p="http://schemas.openxmlformats.org/presentationml/2006/main">
+  <p:cSld>
+    <p:spTree>
+      <p:nvGrpSpPr>
+        <p:cNvPr id="1" name="">
+          <a:extLst>
+            <a:ext uri="{FF2B5EF4-FFF2-40B4-BE49-F238E27FC236}">
+              <a16:creationId xmlns:a16="http://schemas.microsoft.com/office/drawing/2014/main" id="{C3C2B9BC-4D77-71FA-22BD-DEC2991C0275}"/>
+            </a:ext>
+          </a:extLst>
+        </p:cNvPr>
+        <p:cNvGrpSpPr/>
+        <p:nvPr/>
+      </p:nvGrpSpPr>
+      <p:grpSpPr>
+        <a:xfrm>
+          <a:off x="0" y="0"/>
+          <a:ext cx="0" cy="0"/>
+          <a:chOff x="0" y="0"/>
+          <a:chExt cx="0" cy="0"/>
+        </a:xfrm>
+      </p:grpSpPr>
+      <p:sp>
+        <p:nvSpPr>
           <p:cNvPr id="4" name="Rectangle 1">
             <a:extLst>
               <a:ext uri="{FF2B5EF4-FFF2-40B4-BE49-F238E27FC236}">
-                <a16:creationId xmlns:a16="http://schemas.microsoft.com/office/drawing/2014/main" id="{99575A7C-4FF6-FC42-ECA0-A41185AD998B}"/>
+                <a16:creationId xmlns:a16="http://schemas.microsoft.com/office/drawing/2014/main" id="{11916242-428B-5258-041D-20B2F8F78CEA}"/>
               </a:ext>
             </a:extLst>
           </p:cNvPr>
@@ -4826,108 +5055,7 @@
     </p:spTree>
     <p:extLst>
       <p:ext uri="{BB962C8B-B14F-4D97-AF65-F5344CB8AC3E}">
-        <p14:creationId xmlns:p14="http://schemas.microsoft.com/office/powerpoint/2010/main" val="193414397"/>
-      </p:ext>
-    </p:extLst>
-  </p:cSld>
-  <p:clrMapOvr>
-    <a:masterClrMapping/>
-  </p:clrMapOvr>
-</p:sld>
-</file>
-
-<file path=ppt/slides/slide4.xml><?xml version="1.0" encoding="utf-8"?>
-<p:sld xmlns:a="http://schemas.openxmlformats.org/drawingml/2006/main" xmlns:r="http://schemas.openxmlformats.org/officeDocument/2006/relationships" xmlns:p="http://schemas.openxmlformats.org/presentationml/2006/main">
-  <p:cSld>
-    <p:spTree>
-      <p:nvGrpSpPr>
-        <p:cNvPr id="1" name=""/>
-        <p:cNvGrpSpPr/>
-        <p:nvPr/>
-      </p:nvGrpSpPr>
-      <p:grpSpPr>
-        <a:xfrm>
-          <a:off x="0" y="0"/>
-          <a:ext cx="0" cy="0"/>
-          <a:chOff x="0" y="0"/>
-          <a:chExt cx="0" cy="0"/>
-        </a:xfrm>
-      </p:grpSpPr>
-      <p:sp>
-        <p:nvSpPr>
-          <p:cNvPr id="3" name="Content Placeholder 2">
-            <a:extLst>
-              <a:ext uri="{FF2B5EF4-FFF2-40B4-BE49-F238E27FC236}">
-                <a16:creationId xmlns:a16="http://schemas.microsoft.com/office/drawing/2014/main" id="{7F4AA440-67AA-2224-44DC-2F2CE98C8747}"/>
-              </a:ext>
-            </a:extLst>
-          </p:cNvPr>
-          <p:cNvSpPr>
-            <a:spLocks noGrp="1"/>
-          </p:cNvSpPr>
-          <p:nvPr>
-            <p:ph idx="1"/>
-          </p:nvPr>
-        </p:nvSpPr>
-        <p:spPr/>
-        <p:txBody>
-          <a:bodyPr>
-            <a:normAutofit fontScale="92500" lnSpcReduction="10000"/>
-          </a:bodyPr>
-          <a:lstStyle/>
-          <a:p>
-            <a:r>
-              <a:rPr lang="en-US" dirty="0"/>
-              <a:t>start with 5 randomly generated.</a:t>
-            </a:r>
-          </a:p>
-          <a:p>
-            <a:r>
-              <a:rPr lang="en-US" dirty="0"/>
-              <a:t>Each time one drops off food - record their genome.</a:t>
-            </a:r>
-          </a:p>
-          <a:p>
-            <a:r>
-              <a:rPr lang="en-US" dirty="0"/>
-              <a:t>At spawn time perform cross-over and mutation on those that have dropped off food</a:t>
-            </a:r>
-          </a:p>
-          <a:p>
-            <a:r>
-              <a:rPr lang="en-US" dirty="0"/>
-              <a:t> - design choices: selection from {since the last spawn, out of the last 5-10, out of all over lifetime, ranked by energy and lifetime}?</a:t>
-            </a:r>
-            <a:br>
-              <a:rPr lang="en-US" dirty="0"/>
-            </a:br>
-            <a:endParaRPr lang="en-US" dirty="0"/>
-          </a:p>
-          <a:p>
-            <a:r>
-              <a:rPr lang="en-US" dirty="0"/>
-              <a:t>If there hasn't been a spawn in a set time period, spawn a new agent anyway?</a:t>
-            </a:r>
-            <a:br>
-              <a:rPr lang="en-US" dirty="0"/>
-            </a:br>
-            <a:endParaRPr lang="en-US" dirty="0"/>
-          </a:p>
-          <a:p>
-            <a:r>
-              <a:rPr lang="en-US" dirty="0"/>
-              <a:t>If there is a colony collapse restart OR carry over best and restart?</a:t>
-            </a:r>
-          </a:p>
-          <a:p>
-            <a:endParaRPr lang="en-US" dirty="0"/>
-          </a:p>
-        </p:txBody>
-      </p:sp>
-    </p:spTree>
-    <p:extLst>
-      <p:ext uri="{BB962C8B-B14F-4D97-AF65-F5344CB8AC3E}">
-        <p14:creationId xmlns:p14="http://schemas.microsoft.com/office/powerpoint/2010/main" val="303062046"/>
+        <p14:creationId xmlns:p14="http://schemas.microsoft.com/office/powerpoint/2010/main" val="97978303"/>
       </p:ext>
     </p:extLst>
   </p:cSld>
@@ -4942,7 +5070,13 @@
   <p:cSld>
     <p:spTree>
       <p:nvGrpSpPr>
-        <p:cNvPr id="1" name=""/>
+        <p:cNvPr id="1" name="">
+          <a:extLst>
+            <a:ext uri="{FF2B5EF4-FFF2-40B4-BE49-F238E27FC236}">
+              <a16:creationId xmlns:a16="http://schemas.microsoft.com/office/drawing/2014/main" id="{FC82F201-FE17-914E-EB12-209122997C70}"/>
+            </a:ext>
+          </a:extLst>
+        </p:cNvPr>
         <p:cNvGrpSpPr/>
         <p:nvPr/>
       </p:nvGrpSpPr>
@@ -4956,146 +5090,79 @@
       </p:grpSpPr>
       <p:sp>
         <p:nvSpPr>
-          <p:cNvPr id="2" name="Title 1">
-            <a:extLst>
-              <a:ext uri="{FF2B5EF4-FFF2-40B4-BE49-F238E27FC236}">
-                <a16:creationId xmlns:a16="http://schemas.microsoft.com/office/drawing/2014/main" id="{3284076A-9AF3-F328-AABF-629D21CFBBA1}"/>
-              </a:ext>
-            </a:extLst>
-          </p:cNvPr>
-          <p:cNvSpPr>
-            <a:spLocks noGrp="1"/>
-          </p:cNvSpPr>
-          <p:nvPr>
-            <p:ph type="title"/>
+          <p:cNvPr id="3" name="Content Placeholder 2">
+            <a:extLst>
+              <a:ext uri="{FF2B5EF4-FFF2-40B4-BE49-F238E27FC236}">
+                <a16:creationId xmlns:a16="http://schemas.microsoft.com/office/drawing/2014/main" id="{A22CB97A-9BEA-3C36-A54A-D24E21C9A497}"/>
+              </a:ext>
+            </a:extLst>
+          </p:cNvPr>
+          <p:cNvSpPr>
+            <a:spLocks noGrp="1"/>
+          </p:cNvSpPr>
+          <p:nvPr>
+            <p:ph idx="1"/>
           </p:nvPr>
         </p:nvSpPr>
         <p:spPr/>
         <p:txBody>
-          <a:bodyPr/>
-          <a:lstStyle/>
-          <a:p>
-            <a:endParaRPr lang="en-US"/>
-          </a:p>
-        </p:txBody>
-      </p:sp>
-      <p:sp>
-        <p:nvSpPr>
-          <p:cNvPr id="3" name="Content Placeholder 2">
-            <a:extLst>
-              <a:ext uri="{FF2B5EF4-FFF2-40B4-BE49-F238E27FC236}">
-                <a16:creationId xmlns:a16="http://schemas.microsoft.com/office/drawing/2014/main" id="{2433117F-A338-9250-E55F-1465550D7882}"/>
-              </a:ext>
-            </a:extLst>
-          </p:cNvPr>
-          <p:cNvSpPr>
-            <a:spLocks noGrp="1"/>
-          </p:cNvSpPr>
-          <p:nvPr>
-            <p:ph idx="1"/>
-          </p:nvPr>
-        </p:nvSpPr>
-        <p:spPr/>
-        <p:txBody>
           <a:bodyPr>
-            <a:normAutofit fontScale="55000" lnSpcReduction="20000"/>
+            <a:normAutofit fontScale="92500" lnSpcReduction="10000"/>
           </a:bodyPr>
           <a:lstStyle/>
           <a:p>
             <a:r>
               <a:rPr lang="en-US" dirty="0"/>
-              <a:t>Life-Long System</a:t>
-            </a:r>
-          </a:p>
-          <a:p>
+              <a:t>start with 5 randomly generated.</a:t>
+            </a:r>
+          </a:p>
+          <a:p>
+            <a:r>
+              <a:rPr lang="en-US" dirty="0"/>
+              <a:t>Each time one drops off food - record their genome.</a:t>
+            </a:r>
+          </a:p>
+          <a:p>
+            <a:r>
+              <a:rPr lang="en-US" dirty="0"/>
+              <a:t>At spawn time perform cross-over and mutation on those that have dropped off food</a:t>
+            </a:r>
+          </a:p>
+          <a:p>
+            <a:r>
+              <a:rPr lang="en-US" dirty="0"/>
+              <a:t> - design choices: selection from {since the last spawn, out of the last 5-10, out of all over lifetime, ranked by energy and lifetime}?</a:t>
+            </a:r>
+            <a:br>
+              <a:rPr lang="en-US" dirty="0"/>
+            </a:br>
             <a:endParaRPr lang="en-US" dirty="0"/>
           </a:p>
           <a:p>
             <a:r>
               <a:rPr lang="en-US" dirty="0"/>
-              <a:t> Problem, most self-organizing happens at one layer. Need at least 2. Addressed with behavior tree and colony performance?</a:t>
-            </a:r>
-          </a:p>
-          <a:p>
-            <a:r>
+              <a:t>If there hasn't been a spawn in a set time period, spawn a new agent anyway?</a:t>
+            </a:r>
+            <a:br>
               <a:rPr lang="en-US" dirty="0"/>
-              <a:t>  i.e. individual learning and ?social learning?</a:t>
-            </a:r>
+            </a:br>
+            <a:endParaRPr lang="en-US" dirty="0"/>
           </a:p>
           <a:p>
             <a:r>
               <a:rPr lang="en-US" dirty="0"/>
-              <a:t> </a:t>
-            </a:r>
-          </a:p>
-          <a:p>
-            <a:r>
-              <a:rPr lang="en-US" dirty="0"/>
-              <a:t> Qualia World isn't quite working, but the colony is. So can connect something.</a:t>
-            </a:r>
-          </a:p>
-          <a:p>
-            <a:r>
-              <a:rPr lang="en-US" dirty="0"/>
-              <a:t>    Genetic Programming worked with </a:t>
-            </a:r>
-            <a:r>
-              <a:rPr lang="en-US" dirty="0" err="1"/>
-              <a:t>Robocode</a:t>
-            </a:r>
-            <a:r>
-              <a:rPr lang="en-US" dirty="0"/>
-              <a:t>. Problem Genetic algorithm approaches are population based, not necessarily based on continuous spawning. How to do this?</a:t>
-            </a:r>
-          </a:p>
-          <a:p>
-            <a:r>
-              <a:rPr lang="en-US" dirty="0"/>
-              <a:t>	Examples found seem to only use mutation.</a:t>
-            </a:r>
-          </a:p>
-          <a:p>
-            <a:r>
-              <a:rPr lang="en-US" dirty="0"/>
-              <a:t>	Fitness eval (length of life) will be very sparse when agents do well. This matches the target domain of ASCE-BITS because feedback from humans has been shown to be sparse in the HRA version.</a:t>
-            </a:r>
-          </a:p>
-          <a:p>
-            <a:r>
-              <a:rPr lang="en-US" dirty="0"/>
-              <a:t>	</a:t>
-            </a:r>
-          </a:p>
-          <a:p>
-            <a:r>
-              <a:rPr lang="en-US" dirty="0"/>
-              <a:t>	</a:t>
-            </a:r>
-          </a:p>
-          <a:p>
-            <a:r>
-              <a:rPr lang="en-US" dirty="0"/>
-              <a:t> GADO: Genetic...</a:t>
-            </a:r>
-          </a:p>
-          <a:p>
-            <a:r>
-              <a:rPr lang="en-US" dirty="0"/>
-              <a:t> Does the Field of Computational life?</a:t>
-            </a:r>
-          </a:p>
-          <a:p>
-            <a:r>
-              <a:rPr lang="en-US"/>
-              <a:t>https://pdxscholar.library.pdf.edu/cgi/viewcontent.cgi?article=1003&amp;context=compsci_fac</a:t>
-            </a:r>
+              <a:t>If there is a colony collapse restart OR carry over best and restart?</a:t>
+            </a:r>
+          </a:p>
+          <a:p>
+            <a:endParaRPr lang="en-US" dirty="0"/>
           </a:p>
         </p:txBody>
       </p:sp>
     </p:spTree>
     <p:extLst>
       <p:ext uri="{BB962C8B-B14F-4D97-AF65-F5344CB8AC3E}">
-        <p14:creationId xmlns:p14="http://schemas.microsoft.com/office/powerpoint/2010/main" val="590771946"/>
+        <p14:creationId xmlns:p14="http://schemas.microsoft.com/office/powerpoint/2010/main" val="2008437268"/>
       </p:ext>
     </p:extLst>
   </p:cSld>

</xml_diff>

<commit_message>
Correction of Vehicle frame to draw correctly
</commit_message>
<xml_diff>
--- a/images/VehicleFrames.pptx
+++ b/images/VehicleFrames.pptx
@@ -116,6 +116,59 @@
 </p:presentation>
 </file>
 
+<file path=ppt/changesInfos/changesInfo1.xml><?xml version="1.0" encoding="utf-8"?>
+<pc:chgInfo xmlns:a="http://schemas.openxmlformats.org/drawingml/2006/main" xmlns:r="http://schemas.openxmlformats.org/officeDocument/2006/relationships" xmlns:ac="http://schemas.microsoft.com/office/drawing/2013/main/command" xmlns:pc="http://schemas.microsoft.com/office/powerpoint/2013/main/command">
+  <pc:docChgLst>
+    <pc:chgData name="Bert Peterson" userId="e3ff0d18901dda59" providerId="LiveId" clId="{F91A6803-614A-4918-8B14-C253B44952A8}"/>
+    <pc:docChg chg="undo custSel modSld">
+      <pc:chgData name="Bert Peterson" userId="e3ff0d18901dda59" providerId="LiveId" clId="{F91A6803-614A-4918-8B14-C253B44952A8}" dt="2024-11-22T22:28:16.416" v="23" actId="688"/>
+      <pc:docMkLst>
+        <pc:docMk/>
+      </pc:docMkLst>
+      <pc:sldChg chg="modSp mod">
+        <pc:chgData name="Bert Peterson" userId="e3ff0d18901dda59" providerId="LiveId" clId="{F91A6803-614A-4918-8B14-C253B44952A8}" dt="2024-11-22T22:28:16.416" v="23" actId="688"/>
+        <pc:sldMkLst>
+          <pc:docMk/>
+          <pc:sldMk cId="3275420655" sldId="256"/>
+        </pc:sldMkLst>
+        <pc:spChg chg="mod">
+          <ac:chgData name="Bert Peterson" userId="e3ff0d18901dda59" providerId="LiveId" clId="{F91A6803-614A-4918-8B14-C253B44952A8}" dt="2024-11-22T22:28:16.046" v="21" actId="688"/>
+          <ac:spMkLst>
+            <pc:docMk/>
+            <pc:sldMk cId="3275420655" sldId="256"/>
+            <ac:spMk id="10" creationId="{71227C02-CD27-430A-A6A6-4C9D709C919E}"/>
+          </ac:spMkLst>
+        </pc:spChg>
+        <pc:spChg chg="mod">
+          <ac:chgData name="Bert Peterson" userId="e3ff0d18901dda59" providerId="LiveId" clId="{F91A6803-614A-4918-8B14-C253B44952A8}" dt="2024-11-22T22:28:15.855" v="20" actId="1076"/>
+          <ac:spMkLst>
+            <pc:docMk/>
+            <pc:sldMk cId="3275420655" sldId="256"/>
+            <ac:spMk id="11" creationId="{875F6CB6-BBBA-AD90-1958-D747C0249E44}"/>
+          </ac:spMkLst>
+        </pc:spChg>
+        <pc:spChg chg="mod">
+          <ac:chgData name="Bert Peterson" userId="e3ff0d18901dda59" providerId="LiveId" clId="{F91A6803-614A-4918-8B14-C253B44952A8}" dt="2024-11-22T22:28:15.312" v="17" actId="688"/>
+          <ac:spMkLst>
+            <pc:docMk/>
+            <pc:sldMk cId="3275420655" sldId="256"/>
+            <ac:spMk id="12" creationId="{FDA74976-959A-680E-F15D-4DFDF29ED130}"/>
+          </ac:spMkLst>
+        </pc:spChg>
+        <pc:grpChg chg="mod">
+          <ac:chgData name="Bert Peterson" userId="e3ff0d18901dda59" providerId="LiveId" clId="{F91A6803-614A-4918-8B14-C253B44952A8}" dt="2024-11-22T22:28:16.416" v="23" actId="688"/>
+          <ac:grpSpMkLst>
+            <pc:docMk/>
+            <pc:sldMk cId="3275420655" sldId="256"/>
+            <ac:grpSpMk id="19" creationId="{9A4E2830-C6F0-D5A9-98F2-FE0258AC09F2}"/>
+          </ac:grpSpMkLst>
+        </pc:grpChg>
+      </pc:sldChg>
+    </pc:docChg>
+  </pc:docChgLst>
+</pc:chgInfo>
+</file>
+
 <file path=ppt/slideLayouts/slideLayout1.xml><?xml version="1.0" encoding="utf-8"?>
 <p:sldLayout xmlns:a="http://schemas.openxmlformats.org/drawingml/2006/main" xmlns:r="http://schemas.openxmlformats.org/officeDocument/2006/relationships" xmlns:p="http://schemas.openxmlformats.org/presentationml/2006/main" type="title" preserve="1">
   <p:cSld name="Title Slide">
@@ -263,7 +316,7 @@
           <a:p>
             <a:fld id="{56E108D0-6AE7-49B2-AFDE-F7842EC0DADF}" type="datetimeFigureOut">
               <a:rPr lang="en-US" smtClean="0"/>
-              <a:t>2/28/2024</a:t>
+              <a:t>11/22/2024</a:t>
             </a:fld>
             <a:endParaRPr lang="en-US"/>
           </a:p>
@@ -461,7 +514,7 @@
           <a:p>
             <a:fld id="{56E108D0-6AE7-49B2-AFDE-F7842EC0DADF}" type="datetimeFigureOut">
               <a:rPr lang="en-US" smtClean="0"/>
-              <a:t>2/28/2024</a:t>
+              <a:t>11/22/2024</a:t>
             </a:fld>
             <a:endParaRPr lang="en-US"/>
           </a:p>
@@ -669,7 +722,7 @@
           <a:p>
             <a:fld id="{56E108D0-6AE7-49B2-AFDE-F7842EC0DADF}" type="datetimeFigureOut">
               <a:rPr lang="en-US" smtClean="0"/>
-              <a:t>2/28/2024</a:t>
+              <a:t>11/22/2024</a:t>
             </a:fld>
             <a:endParaRPr lang="en-US"/>
           </a:p>
@@ -867,7 +920,7 @@
           <a:p>
             <a:fld id="{56E108D0-6AE7-49B2-AFDE-F7842EC0DADF}" type="datetimeFigureOut">
               <a:rPr lang="en-US" smtClean="0"/>
-              <a:t>2/28/2024</a:t>
+              <a:t>11/22/2024</a:t>
             </a:fld>
             <a:endParaRPr lang="en-US"/>
           </a:p>
@@ -1142,7 +1195,7 @@
           <a:p>
             <a:fld id="{56E108D0-6AE7-49B2-AFDE-F7842EC0DADF}" type="datetimeFigureOut">
               <a:rPr lang="en-US" smtClean="0"/>
-              <a:t>2/28/2024</a:t>
+              <a:t>11/22/2024</a:t>
             </a:fld>
             <a:endParaRPr lang="en-US"/>
           </a:p>
@@ -1407,7 +1460,7 @@
           <a:p>
             <a:fld id="{56E108D0-6AE7-49B2-AFDE-F7842EC0DADF}" type="datetimeFigureOut">
               <a:rPr lang="en-US" smtClean="0"/>
-              <a:t>2/28/2024</a:t>
+              <a:t>11/22/2024</a:t>
             </a:fld>
             <a:endParaRPr lang="en-US"/>
           </a:p>
@@ -1819,7 +1872,7 @@
           <a:p>
             <a:fld id="{56E108D0-6AE7-49B2-AFDE-F7842EC0DADF}" type="datetimeFigureOut">
               <a:rPr lang="en-US" smtClean="0"/>
-              <a:t>2/28/2024</a:t>
+              <a:t>11/22/2024</a:t>
             </a:fld>
             <a:endParaRPr lang="en-US"/>
           </a:p>
@@ -1960,7 +2013,7 @@
           <a:p>
             <a:fld id="{56E108D0-6AE7-49B2-AFDE-F7842EC0DADF}" type="datetimeFigureOut">
               <a:rPr lang="en-US" smtClean="0"/>
-              <a:t>2/28/2024</a:t>
+              <a:t>11/22/2024</a:t>
             </a:fld>
             <a:endParaRPr lang="en-US"/>
           </a:p>
@@ -2073,7 +2126,7 @@
           <a:p>
             <a:fld id="{56E108D0-6AE7-49B2-AFDE-F7842EC0DADF}" type="datetimeFigureOut">
               <a:rPr lang="en-US" smtClean="0"/>
-              <a:t>2/28/2024</a:t>
+              <a:t>11/22/2024</a:t>
             </a:fld>
             <a:endParaRPr lang="en-US"/>
           </a:p>
@@ -2384,7 +2437,7 @@
           <a:p>
             <a:fld id="{56E108D0-6AE7-49B2-AFDE-F7842EC0DADF}" type="datetimeFigureOut">
               <a:rPr lang="en-US" smtClean="0"/>
-              <a:t>2/28/2024</a:t>
+              <a:t>11/22/2024</a:t>
             </a:fld>
             <a:endParaRPr lang="en-US"/>
           </a:p>
@@ -2672,7 +2725,7 @@
           <a:p>
             <a:fld id="{56E108D0-6AE7-49B2-AFDE-F7842EC0DADF}" type="datetimeFigureOut">
               <a:rPr lang="en-US" smtClean="0"/>
-              <a:t>2/28/2024</a:t>
+              <a:t>11/22/2024</a:t>
             </a:fld>
             <a:endParaRPr lang="en-US"/>
           </a:p>
@@ -2913,7 +2966,7 @@
           <a:p>
             <a:fld id="{56E108D0-6AE7-49B2-AFDE-F7842EC0DADF}" type="datetimeFigureOut">
               <a:rPr lang="en-US" smtClean="0"/>
-              <a:t>2/28/2024</a:t>
+              <a:t>11/22/2024</a:t>
             </a:fld>
             <a:endParaRPr lang="en-US"/>
           </a:p>
@@ -3374,9 +3427,9 @@
         <p:grpSpPr>
           <a:xfrm>
             <a:off x="1159139" y="3620819"/>
-            <a:ext cx="2668158" cy="2427762"/>
-            <a:chOff x="2764004" y="3100820"/>
-            <a:chExt cx="2668158" cy="2427762"/>
+            <a:ext cx="2668158" cy="2427765"/>
+            <a:chOff x="2764005" y="3100817"/>
+            <a:chExt cx="2668158" cy="2427765"/>
           </a:xfrm>
         </p:grpSpPr>
         <p:cxnSp>
@@ -3479,7 +3532,7 @@
           </p:nvSpPr>
           <p:spPr>
             <a:xfrm>
-              <a:off x="4878353" y="4184574"/>
+              <a:off x="4878354" y="4184575"/>
               <a:ext cx="553809" cy="369332"/>
             </a:xfrm>
             <a:prstGeom prst="rect">
@@ -3503,8 +3556,8 @@
             </a:p>
           </p:txBody>
         </p:sp>
-        <mc:AlternateContent xmlns:mc="http://schemas.openxmlformats.org/markup-compatibility/2006" xmlns:a14="http://schemas.microsoft.com/office/drawing/2010/main">
-          <mc:Choice Requires="a14">
+        <mc:AlternateContent xmlns:mc="http://schemas.openxmlformats.org/markup-compatibility/2006">
+          <mc:Choice xmlns:a14="http://schemas.microsoft.com/office/drawing/2010/main" Requires="a14">
             <p:sp>
               <p:nvSpPr>
                 <p:cNvPr id="11" name="TextBox 10">
@@ -3519,7 +3572,7 @@
               </p:nvSpPr>
               <p:spPr>
                 <a:xfrm>
-                  <a:off x="2895601" y="3100820"/>
+                  <a:off x="2895603" y="3100817"/>
                   <a:ext cx="553809" cy="562975"/>
                 </a:xfrm>
                 <a:prstGeom prst="rect">
@@ -3579,7 +3632,7 @@
               </p:txBody>
             </p:sp>
           </mc:Choice>
-          <mc:Fallback xmlns="">
+          <mc:Fallback>
             <p:sp>
               <p:nvSpPr>
                 <p:cNvPr id="11" name="TextBox 10">
@@ -3596,7 +3649,7 @@
               </p:nvSpPr>
               <p:spPr>
                 <a:xfrm>
-                  <a:off x="2895601" y="3100820"/>
+                  <a:off x="2895603" y="3100817"/>
                   <a:ext cx="553809" cy="562975"/>
                 </a:xfrm>
                 <a:prstGeom prst="rect">
@@ -3624,8 +3677,8 @@
             </p:sp>
           </mc:Fallback>
         </mc:AlternateContent>
-        <mc:AlternateContent xmlns:mc="http://schemas.openxmlformats.org/markup-compatibility/2006" xmlns:a14="http://schemas.microsoft.com/office/drawing/2010/main">
-          <mc:Choice Requires="a14">
+        <mc:AlternateContent xmlns:mc="http://schemas.openxmlformats.org/markup-compatibility/2006">
+          <mc:Choice xmlns:a14="http://schemas.microsoft.com/office/drawing/2010/main" Requires="a14">
             <p:sp>
               <p:nvSpPr>
                 <p:cNvPr id="12" name="TextBox 11">
@@ -3640,7 +3693,7 @@
               </p:nvSpPr>
               <p:spPr>
                 <a:xfrm>
-                  <a:off x="2764004" y="4965607"/>
+                  <a:off x="2764005" y="4965607"/>
                   <a:ext cx="553809" cy="562975"/>
                 </a:xfrm>
                 <a:prstGeom prst="rect">
@@ -3707,7 +3760,7 @@
               </p:txBody>
             </p:sp>
           </mc:Choice>
-          <mc:Fallback xmlns="">
+          <mc:Fallback>
             <p:sp>
               <p:nvSpPr>
                 <p:cNvPr id="12" name="TextBox 11">
@@ -3724,7 +3777,7 @@
               </p:nvSpPr>
               <p:spPr>
                 <a:xfrm>
-                  <a:off x="2764004" y="4965607"/>
+                  <a:off x="2764005" y="4965607"/>
                   <a:ext cx="553809" cy="562975"/>
                 </a:xfrm>
                 <a:prstGeom prst="rect">

</xml_diff>